<commit_message>
Update numpy and other libraries in the Image Processing Software notebook
Updated numpy version from 1.25.2 to 1.26.0 in Image Processing Software notebook to ensure compatibility with the upgraded packages. Also, removed the installation process for already upgraded libraries such as opencv-python and matplotlib. The improvement provides an increase in execution efficiency due to updated libraries, fulfilling the dependencies that the newest libraries need, avoiding potential fallbacks or errors that can occur from outdated packages.
</commit_message>
<xml_diff>
--- a/(Advanced) Multimedia Information Processing and Communications/(A)MIPaC Introduction.pptx
+++ b/(Advanced) Multimedia Information Processing and Communications/(A)MIPaC Introduction.pptx
@@ -799,6 +799,21 @@
             </a:pPr>
             <a:r>
               <a:rPr lang="en-PL" dirty="0"/>
+              <a:t>Bez uwzględnienia correction quiz:</a:t>
+            </a:r>
+          </a:p>
+          <a:p>
+            <a:pPr marL="0" lvl="0" indent="0" algn="l" rtl="0">
+              <a:spcBef>
+                <a:spcPts val="0"/>
+              </a:spcBef>
+              <a:spcAft>
+                <a:spcPts val="0"/>
+              </a:spcAft>
+              <a:buNone/>
+            </a:pPr>
+            <a:r>
+              <a:rPr lang="en-PL" dirty="0"/>
               <a:t>3.0: 0,408163265306122</a:t>
             </a:r>
           </a:p>
@@ -858,10 +873,131 @@
               <a:buNone/>
             </a:pPr>
             <a:r>
-              <a:rPr lang="en-PL"/>
+              <a:rPr lang="en-PL" dirty="0"/>
               <a:t>5.0: 0,73469387755102</a:t>
             </a:r>
-            <a:endParaRPr/>
+          </a:p>
+          <a:p>
+            <a:pPr marL="0" lvl="0" indent="0" algn="l" rtl="0">
+              <a:spcBef>
+                <a:spcPts val="0"/>
+              </a:spcBef>
+              <a:spcAft>
+                <a:spcPts val="0"/>
+              </a:spcAft>
+              <a:buNone/>
+            </a:pPr>
+            <a:endParaRPr lang="en-PL" dirty="0"/>
+          </a:p>
+          <a:p>
+            <a:pPr marL="0" lvl="0" indent="0" algn="l" rtl="0">
+              <a:spcBef>
+                <a:spcPts val="0"/>
+              </a:spcBef>
+              <a:spcAft>
+                <a:spcPts val="0"/>
+              </a:spcAft>
+              <a:buNone/>
+            </a:pPr>
+            <a:r>
+              <a:rPr lang="en-GB" dirty="0"/>
+              <a:t>Z </a:t>
+            </a:r>
+            <a:r>
+              <a:rPr lang="en-GB" dirty="0" err="1"/>
+              <a:t>uwzględnieniem</a:t>
+            </a:r>
+            <a:r>
+              <a:rPr lang="en-GB" dirty="0"/>
+              <a:t> correction quiz:</a:t>
+            </a:r>
+          </a:p>
+          <a:p>
+            <a:pPr marL="0" lvl="0" indent="0" algn="l" rtl="0">
+              <a:spcBef>
+                <a:spcPts val="0"/>
+              </a:spcBef>
+              <a:spcAft>
+                <a:spcPts val="0"/>
+              </a:spcAft>
+              <a:buNone/>
+            </a:pPr>
+            <a:r>
+              <a:rPr lang="en-GB" dirty="0"/>
+              <a:t>3.0: 0,408163265306122*0,710144927536232=0,289855072463768</a:t>
+            </a:r>
+          </a:p>
+          <a:p>
+            <a:pPr marL="0" lvl="0" indent="0" algn="l" rtl="0">
+              <a:spcBef>
+                <a:spcPts val="0"/>
+              </a:spcBef>
+              <a:spcAft>
+                <a:spcPts val="0"/>
+              </a:spcAft>
+              <a:buNone/>
+            </a:pPr>
+            <a:r>
+              <a:rPr lang="en-GB" dirty="0"/>
+              <a:t>3.5: 0,489795918367347*0,710144927536232=0,347826086956522</a:t>
+            </a:r>
+          </a:p>
+          <a:p>
+            <a:pPr marL="0" lvl="0" indent="0" algn="l" rtl="0">
+              <a:spcBef>
+                <a:spcPts val="0"/>
+              </a:spcBef>
+              <a:spcAft>
+                <a:spcPts val="0"/>
+              </a:spcAft>
+              <a:buNone/>
+            </a:pPr>
+            <a:r>
+              <a:rPr lang="en-GB" dirty="0"/>
+              <a:t>4.0: 0,571428571428571*0,710144927536232=0,405797101449275</a:t>
+            </a:r>
+          </a:p>
+          <a:p>
+            <a:pPr marL="0" lvl="0" indent="0" algn="l" rtl="0">
+              <a:spcBef>
+                <a:spcPts val="0"/>
+              </a:spcBef>
+              <a:spcAft>
+                <a:spcPts val="0"/>
+              </a:spcAft>
+              <a:buNone/>
+            </a:pPr>
+            <a:r>
+              <a:rPr lang="en-GB" dirty="0"/>
+              <a:t>4.5: 0,653061224489796*0,710144927536232=0,463768115942029</a:t>
+            </a:r>
+          </a:p>
+          <a:p>
+            <a:pPr marL="0" lvl="0" indent="0" algn="l" rtl="0">
+              <a:spcBef>
+                <a:spcPts val="0"/>
+              </a:spcBef>
+              <a:spcAft>
+                <a:spcPts val="0"/>
+              </a:spcAft>
+              <a:buNone/>
+            </a:pPr>
+            <a:r>
+              <a:rPr lang="en-GB" dirty="0"/>
+              <a:t>5.0: 0,73469387755102*0,710144927536232=0,521739130434782</a:t>
+            </a:r>
+          </a:p>
+          <a:p>
+            <a:pPr marL="0" lvl="0" indent="0" algn="l" rtl="0">
+              <a:spcBef>
+                <a:spcPts val="0"/>
+              </a:spcBef>
+              <a:spcAft>
+                <a:spcPts val="0"/>
+              </a:spcAft>
+              <a:buNone/>
+            </a:pPr>
+            <a:endParaRPr dirty="0"/>
           </a:p>
         </p:txBody>
       </p:sp>

</xml_diff>